<commit_message>
gs 95 % ready
</commit_message>
<xml_diff>
--- a/image/betl_architecture.pptx
+++ b/image/betl_architecture.pptx
@@ -276,7 +276,7 @@
           <a:p>
             <a:fld id="{1719DC78-B2E2-489A-B4DC-503C173C394C}" type="datetimeFigureOut">
               <a:rPr lang="en-NL" smtClean="0"/>
-              <a:t>18/01/2022</a:t>
+              <a:t>24/01/2022</a:t>
             </a:fld>
             <a:endParaRPr lang="en-NL"/>
           </a:p>
@@ -476,7 +476,7 @@
           <a:p>
             <a:fld id="{1719DC78-B2E2-489A-B4DC-503C173C394C}" type="datetimeFigureOut">
               <a:rPr lang="en-NL" smtClean="0"/>
-              <a:t>18/01/2022</a:t>
+              <a:t>24/01/2022</a:t>
             </a:fld>
             <a:endParaRPr lang="en-NL"/>
           </a:p>
@@ -686,7 +686,7 @@
           <a:p>
             <a:fld id="{1719DC78-B2E2-489A-B4DC-503C173C394C}" type="datetimeFigureOut">
               <a:rPr lang="en-NL" smtClean="0"/>
-              <a:t>18/01/2022</a:t>
+              <a:t>24/01/2022</a:t>
             </a:fld>
             <a:endParaRPr lang="en-NL"/>
           </a:p>
@@ -886,7 +886,7 @@
           <a:p>
             <a:fld id="{1719DC78-B2E2-489A-B4DC-503C173C394C}" type="datetimeFigureOut">
               <a:rPr lang="en-NL" smtClean="0"/>
-              <a:t>18/01/2022</a:t>
+              <a:t>24/01/2022</a:t>
             </a:fld>
             <a:endParaRPr lang="en-NL"/>
           </a:p>
@@ -1162,7 +1162,7 @@
           <a:p>
             <a:fld id="{1719DC78-B2E2-489A-B4DC-503C173C394C}" type="datetimeFigureOut">
               <a:rPr lang="en-NL" smtClean="0"/>
-              <a:t>18/01/2022</a:t>
+              <a:t>24/01/2022</a:t>
             </a:fld>
             <a:endParaRPr lang="en-NL"/>
           </a:p>
@@ -1430,7 +1430,7 @@
           <a:p>
             <a:fld id="{1719DC78-B2E2-489A-B4DC-503C173C394C}" type="datetimeFigureOut">
               <a:rPr lang="en-NL" smtClean="0"/>
-              <a:t>18/01/2022</a:t>
+              <a:t>24/01/2022</a:t>
             </a:fld>
             <a:endParaRPr lang="en-NL"/>
           </a:p>
@@ -1845,7 +1845,7 @@
           <a:p>
             <a:fld id="{1719DC78-B2E2-489A-B4DC-503C173C394C}" type="datetimeFigureOut">
               <a:rPr lang="en-NL" smtClean="0"/>
-              <a:t>18/01/2022</a:t>
+              <a:t>24/01/2022</a:t>
             </a:fld>
             <a:endParaRPr lang="en-NL"/>
           </a:p>
@@ -1987,7 +1987,7 @@
           <a:p>
             <a:fld id="{1719DC78-B2E2-489A-B4DC-503C173C394C}" type="datetimeFigureOut">
               <a:rPr lang="en-NL" smtClean="0"/>
-              <a:t>18/01/2022</a:t>
+              <a:t>24/01/2022</a:t>
             </a:fld>
             <a:endParaRPr lang="en-NL"/>
           </a:p>
@@ -2100,7 +2100,7 @@
           <a:p>
             <a:fld id="{1719DC78-B2E2-489A-B4DC-503C173C394C}" type="datetimeFigureOut">
               <a:rPr lang="en-NL" smtClean="0"/>
-              <a:t>18/01/2022</a:t>
+              <a:t>24/01/2022</a:t>
             </a:fld>
             <a:endParaRPr lang="en-NL"/>
           </a:p>
@@ -2413,7 +2413,7 @@
           <a:p>
             <a:fld id="{1719DC78-B2E2-489A-B4DC-503C173C394C}" type="datetimeFigureOut">
               <a:rPr lang="en-NL" smtClean="0"/>
-              <a:t>18/01/2022</a:t>
+              <a:t>24/01/2022</a:t>
             </a:fld>
             <a:endParaRPr lang="en-NL"/>
           </a:p>
@@ -2702,7 +2702,7 @@
           <a:p>
             <a:fld id="{1719DC78-B2E2-489A-B4DC-503C173C394C}" type="datetimeFigureOut">
               <a:rPr lang="en-NL" smtClean="0"/>
-              <a:t>18/01/2022</a:t>
+              <a:t>24/01/2022</a:t>
             </a:fld>
             <a:endParaRPr lang="en-NL"/>
           </a:p>
@@ -2945,7 +2945,7 @@
           <a:p>
             <a:fld id="{1719DC78-B2E2-489A-B4DC-503C173C394C}" type="datetimeFigureOut">
               <a:rPr lang="en-NL" smtClean="0"/>
-              <a:t>18/01/2022</a:t>
+              <a:t>24/01/2022</a:t>
             </a:fld>
             <a:endParaRPr lang="en-NL"/>
           </a:p>
@@ -8772,19 +8772,19 @@
               <a:t>MyDWH</a:t>
             </a:r>
             <a:br>
-              <a:rPr lang="en-US" sz="1400" dirty="0">
+              <a:rPr lang="en-US" sz="1400">
                 <a:solidFill>
                   <a:schemeClr val="tx1"/>
                 </a:solidFill>
               </a:rPr>
             </a:br>
             <a:r>
-              <a:rPr lang="en-US" sz="1400" dirty="0">
+              <a:rPr lang="en-US" sz="1400">
                 <a:solidFill>
                   <a:schemeClr val="tx1"/>
                 </a:solidFill>
               </a:rPr>
-              <a:t>Staging</a:t>
+              <a:t>RDW</a:t>
             </a:r>
             <a:endParaRPr lang="en-NL" sz="1400" dirty="0">
               <a:solidFill>

</xml_diff>